<commit_message>
publish labs for stack and Topic 08
</commit_message>
<xml_diff>
--- a/topic07-structuring-programs/unit-07a-lectures/talk-1/a-before-stack.pptx
+++ b/topic07-structuring-programs/unit-07a-lectures/talk-1/a-before-stack.pptx
@@ -557,14 +557,14 @@
           </a:ln>
           <a:extLst>
             <a:ext uri="{909E8E84-426E-40dd-AFC4-6F175D3DCCD1}">
-              <a14:hiddenFill xmlns:a14="http://schemas.microsoft.com/office/drawing/2010/main" xmlns="">
+              <a14:hiddenFill xmlns="" xmlns:a14="http://schemas.microsoft.com/office/drawing/2010/main">
                 <a:solidFill>
                   <a:srgbClr val="FFFFFF"/>
                 </a:solidFill>
               </a14:hiddenFill>
             </a:ext>
             <a:ext uri="{FAA26D3D-D897-4be2-8F04-BA451C77F1D7}">
-              <ma14:placeholderFlag xmlns:ma14="http://schemas.microsoft.com/office/mac/drawingml/2011/main" xmlns="" val="1"/>
+              <ma14:placeholderFlag xmlns="" xmlns:ma14="http://schemas.microsoft.com/office/mac/drawingml/2011/main" val="1"/>
             </a:ext>
           </a:extLst>
         </p:spPr>
@@ -906,14 +906,14 @@
           </a:ln>
           <a:extLst>
             <a:ext uri="{909E8E84-426E-40dd-AFC4-6F175D3DCCD1}">
-              <a14:hiddenFill xmlns:a14="http://schemas.microsoft.com/office/drawing/2010/main" xmlns="">
+              <a14:hiddenFill xmlns="" xmlns:a14="http://schemas.microsoft.com/office/drawing/2010/main">
                 <a:solidFill>
                   <a:srgbClr val="FFFFFF"/>
                 </a:solidFill>
               </a14:hiddenFill>
             </a:ext>
             <a:ext uri="{91240B29-F687-4f45-9708-019B960494DF}">
-              <a14:hiddenLine xmlns:a14="http://schemas.microsoft.com/office/drawing/2010/main" xmlns="" w="9525">
+              <a14:hiddenLine xmlns="" xmlns:a14="http://schemas.microsoft.com/office/drawing/2010/main" w="9525">
                 <a:solidFill>
                   <a:srgbClr val="000000"/>
                 </a:solidFill>
@@ -1074,14 +1074,14 @@
           </a:ln>
           <a:extLst>
             <a:ext uri="{909E8E84-426E-40dd-AFC4-6F175D3DCCD1}">
-              <a14:hiddenFill xmlns:a14="http://schemas.microsoft.com/office/drawing/2010/main" xmlns="">
+              <a14:hiddenFill xmlns="" xmlns:a14="http://schemas.microsoft.com/office/drawing/2010/main">
                 <a:solidFill>
                   <a:srgbClr val="FFFFFF"/>
                 </a:solidFill>
               </a14:hiddenFill>
             </a:ext>
             <a:ext uri="{91240B29-F687-4f45-9708-019B960494DF}">
-              <a14:hiddenLine xmlns:a14="http://schemas.microsoft.com/office/drawing/2010/main" xmlns="" w="9525">
+              <a14:hiddenLine xmlns="" xmlns:a14="http://schemas.microsoft.com/office/drawing/2010/main" w="9525">
                 <a:solidFill>
                   <a:srgbClr val="000000"/>
                 </a:solidFill>
@@ -1144,7 +1144,7 @@
           </a:ln>
           <a:extLst>
             <a:ext uri="{91240B29-F687-4f45-9708-019B960494DF}">
-              <a14:hiddenLine xmlns:a14="http://schemas.microsoft.com/office/drawing/2010/main" xmlns="" w="9525">
+              <a14:hiddenLine xmlns="" xmlns:a14="http://schemas.microsoft.com/office/drawing/2010/main" w="9525">
                 <a:solidFill>
                   <a:srgbClr val="000000"/>
                 </a:solidFill>
@@ -3099,14 +3099,14 @@
           </a:ln>
           <a:extLst>
             <a:ext uri="{909E8E84-426E-40dd-AFC4-6F175D3DCCD1}">
-              <a14:hiddenFill xmlns:a14="http://schemas.microsoft.com/office/drawing/2010/main" xmlns="">
+              <a14:hiddenFill xmlns="" xmlns:a14="http://schemas.microsoft.com/office/drawing/2010/main">
                 <a:solidFill>
                   <a:srgbClr val="FFFFFF"/>
                 </a:solidFill>
               </a14:hiddenFill>
             </a:ext>
             <a:ext uri="{91240B29-F687-4f45-9708-019B960494DF}">
-              <a14:hiddenLine xmlns:a14="http://schemas.microsoft.com/office/drawing/2010/main" xmlns="" w="9525">
+              <a14:hiddenLine xmlns="" xmlns:a14="http://schemas.microsoft.com/office/drawing/2010/main" w="9525">
                 <a:solidFill>
                   <a:srgbClr val="000000"/>
                 </a:solidFill>
@@ -3116,7 +3116,7 @@
               </a14:hiddenLine>
             </a:ext>
             <a:ext uri="{FAA26D3D-D897-4be2-8F04-BA451C77F1D7}">
-              <ma14:placeholderFlag xmlns:ma14="http://schemas.microsoft.com/office/mac/drawingml/2011/main" xmlns="" val="1"/>
+              <ma14:placeholderFlag xmlns="" xmlns:ma14="http://schemas.microsoft.com/office/mac/drawingml/2011/main" val="1"/>
             </a:ext>
           </a:extLst>
         </p:spPr>
@@ -3161,14 +3161,14 @@
           </a:ln>
           <a:extLst>
             <a:ext uri="{909E8E84-426E-40dd-AFC4-6F175D3DCCD1}">
-              <a14:hiddenFill xmlns:a14="http://schemas.microsoft.com/office/drawing/2010/main" xmlns="">
+              <a14:hiddenFill xmlns="" xmlns:a14="http://schemas.microsoft.com/office/drawing/2010/main">
                 <a:solidFill>
                   <a:srgbClr val="FFFFFF"/>
                 </a:solidFill>
               </a14:hiddenFill>
             </a:ext>
             <a:ext uri="{91240B29-F687-4f45-9708-019B960494DF}">
-              <a14:hiddenLine xmlns:a14="http://schemas.microsoft.com/office/drawing/2010/main" xmlns="" w="9525">
+              <a14:hiddenLine xmlns="" xmlns:a14="http://schemas.microsoft.com/office/drawing/2010/main" w="9525">
                 <a:solidFill>
                   <a:srgbClr val="000000"/>
                 </a:solidFill>
@@ -3178,7 +3178,7 @@
               </a14:hiddenLine>
             </a:ext>
             <a:ext uri="{FAA26D3D-D897-4be2-8F04-BA451C77F1D7}">
-              <ma14:placeholderFlag xmlns:ma14="http://schemas.microsoft.com/office/mac/drawingml/2011/main" xmlns="" val="1"/>
+              <ma14:placeholderFlag xmlns="" xmlns:ma14="http://schemas.microsoft.com/office/mac/drawingml/2011/main" val="1"/>
             </a:ext>
           </a:extLst>
         </p:spPr>
@@ -3744,14 +3744,14 @@
           <a:noFill/>
           <a:extLst>
             <a:ext uri="{909E8E84-426E-40dd-AFC4-6F175D3DCCD1}">
-              <a14:hiddenFill xmlns:a14="http://schemas.microsoft.com/office/drawing/2010/main" xmlns="">
+              <a14:hiddenFill xmlns="" xmlns:a14="http://schemas.microsoft.com/office/drawing/2010/main">
                 <a:solidFill>
                   <a:srgbClr val="FFFFFF"/>
                 </a:solidFill>
               </a14:hiddenFill>
             </a:ext>
             <a:ext uri="{91240B29-F687-4f45-9708-019B960494DF}">
-              <a14:hiddenLine xmlns:a14="http://schemas.microsoft.com/office/drawing/2010/main" xmlns="" w="9525">
+              <a14:hiddenLine xmlns="" xmlns:a14="http://schemas.microsoft.com/office/drawing/2010/main" w="9525">
                 <a:solidFill>
                   <a:srgbClr val="000000"/>
                 </a:solidFill>
@@ -3999,14 +3999,14 @@
           </a:ln>
           <a:extLst>
             <a:ext uri="{909E8E84-426E-40dd-AFC4-6F175D3DCCD1}">
-              <a14:hiddenFill xmlns:a14="http://schemas.microsoft.com/office/drawing/2010/main" xmlns="">
+              <a14:hiddenFill xmlns="" xmlns:a14="http://schemas.microsoft.com/office/drawing/2010/main">
                 <a:solidFill>
                   <a:srgbClr val="FFFFFF"/>
                 </a:solidFill>
               </a14:hiddenFill>
             </a:ext>
             <a:ext uri="{91240B29-F687-4f45-9708-019B960494DF}">
-              <a14:hiddenLine xmlns:a14="http://schemas.microsoft.com/office/drawing/2010/main" xmlns="" w="9525">
+              <a14:hiddenLine xmlns="" xmlns:a14="http://schemas.microsoft.com/office/drawing/2010/main" w="9525">
                 <a:solidFill>
                   <a:srgbClr val="000000"/>
                 </a:solidFill>
@@ -4091,14 +4091,14 @@
           </a:xfrm>
           <a:extLst>
             <a:ext uri="{909E8E84-426E-40dd-AFC4-6F175D3DCCD1}">
-              <a14:hiddenFill xmlns:a14="http://schemas.microsoft.com/office/drawing/2010/main" xmlns="">
+              <a14:hiddenFill xmlns="" xmlns:a14="http://schemas.microsoft.com/office/drawing/2010/main">
                 <a:solidFill>
                   <a:srgbClr val="FFFFFF"/>
                 </a:solidFill>
               </a14:hiddenFill>
             </a:ext>
             <a:ext uri="{91240B29-F687-4f45-9708-019B960494DF}">
-              <a14:hiddenLine xmlns:a14="http://schemas.microsoft.com/office/drawing/2010/main" xmlns="" w="9525">
+              <a14:hiddenLine xmlns="" xmlns:a14="http://schemas.microsoft.com/office/drawing/2010/main" w="9525">
                 <a:solidFill>
                   <a:srgbClr val="000000"/>
                 </a:solidFill>
@@ -4284,14 +4284,14 @@
           <a:noFill/>
           <a:extLst>
             <a:ext uri="{909E8E84-426E-40dd-AFC4-6F175D3DCCD1}">
-              <a14:hiddenFill xmlns:a14="http://schemas.microsoft.com/office/drawing/2010/main" xmlns="">
+              <a14:hiddenFill xmlns="" xmlns:a14="http://schemas.microsoft.com/office/drawing/2010/main">
                 <a:solidFill>
                   <a:srgbClr val="FFFFFF"/>
                 </a:solidFill>
               </a14:hiddenFill>
             </a:ext>
             <a:ext uri="{91240B29-F687-4f45-9708-019B960494DF}">
-              <a14:hiddenLine xmlns:a14="http://schemas.microsoft.com/office/drawing/2010/main" xmlns="" w="9525">
+              <a14:hiddenLine xmlns="" xmlns:a14="http://schemas.microsoft.com/office/drawing/2010/main" w="9525">
                 <a:solidFill>
                   <a:srgbClr val="000000"/>
                 </a:solidFill>
@@ -5081,14 +5081,14 @@
           <a:ln/>
           <a:extLst>
             <a:ext uri="{909E8E84-426E-40dd-AFC4-6F175D3DCCD1}">
-              <a14:hiddenFill xmlns="" xmlns:a14="http://schemas.microsoft.com/office/drawing/2010/main">
+              <a14:hiddenFill xmlns:a14="http://schemas.microsoft.com/office/drawing/2010/main" xmlns="">
                 <a:solidFill>
                   <a:srgbClr val="FFFFFF"/>
                 </a:solidFill>
               </a14:hiddenFill>
             </a:ext>
             <a:ext uri="{91240B29-F687-4f45-9708-019B960494DF}">
-              <a14:hiddenLine xmlns="" xmlns:a14="http://schemas.microsoft.com/office/drawing/2010/main" w="9525">
+              <a14:hiddenLine xmlns:a14="http://schemas.microsoft.com/office/drawing/2010/main" xmlns="" w="9525">
                 <a:solidFill>
                   <a:srgbClr val="000000"/>
                 </a:solidFill>
@@ -5265,14 +5265,14 @@
           </a:ln>
           <a:extLst>
             <a:ext uri="{909E8E84-426E-40dd-AFC4-6F175D3DCCD1}">
-              <a14:hiddenFill xmlns="" xmlns:a14="http://schemas.microsoft.com/office/drawing/2010/main">
+              <a14:hiddenFill xmlns:a14="http://schemas.microsoft.com/office/drawing/2010/main" xmlns="">
                 <a:solidFill>
                   <a:srgbClr val="FFFFFF"/>
                 </a:solidFill>
               </a14:hiddenFill>
             </a:ext>
             <a:ext uri="{91240B29-F687-4f45-9708-019B960494DF}">
-              <a14:hiddenLine xmlns="" xmlns:a14="http://schemas.microsoft.com/office/drawing/2010/main" w="12700" cap="sq">
+              <a14:hiddenLine xmlns:a14="http://schemas.microsoft.com/office/drawing/2010/main" xmlns="" w="12700" cap="sq">
                 <a:solidFill>
                   <a:srgbClr val="000000"/>
                 </a:solidFill>
@@ -5435,7 +5435,7 @@
           </a:ln>
           <a:extLst>
             <a:ext uri="{91240B29-F687-4f45-9708-019B960494DF}">
-              <a14:hiddenLine xmlns="" xmlns:a14="http://schemas.microsoft.com/office/drawing/2010/main" w="12700" cap="sq">
+              <a14:hiddenLine xmlns:a14="http://schemas.microsoft.com/office/drawing/2010/main" xmlns="" w="12700" cap="sq">
                 <a:solidFill>
                   <a:srgbClr val="000000"/>
                 </a:solidFill>
@@ -5629,14 +5629,14 @@
           </a:ln>
           <a:extLst>
             <a:ext uri="{909E8E84-426E-40dd-AFC4-6F175D3DCCD1}">
-              <a14:hiddenFill xmlns="" xmlns:a14="http://schemas.microsoft.com/office/drawing/2010/main">
+              <a14:hiddenFill xmlns:a14="http://schemas.microsoft.com/office/drawing/2010/main" xmlns="">
                 <a:solidFill>
                   <a:srgbClr val="FFFFFF"/>
                 </a:solidFill>
               </a14:hiddenFill>
             </a:ext>
             <a:ext uri="{91240B29-F687-4f45-9708-019B960494DF}">
-              <a14:hiddenLine xmlns="" xmlns:a14="http://schemas.microsoft.com/office/drawing/2010/main" w="12700" cap="sq">
+              <a14:hiddenLine xmlns:a14="http://schemas.microsoft.com/office/drawing/2010/main" xmlns="" w="12700" cap="sq">
                 <a:solidFill>
                   <a:srgbClr val="000000"/>
                 </a:solidFill>
@@ -5791,7 +5791,7 @@
           </a:ln>
           <a:extLst>
             <a:ext uri="{91240B29-F687-4f45-9708-019B960494DF}">
-              <a14:hiddenLine xmlns="" xmlns:a14="http://schemas.microsoft.com/office/drawing/2010/main" w="12700" cap="sq">
+              <a14:hiddenLine xmlns:a14="http://schemas.microsoft.com/office/drawing/2010/main" xmlns="" w="12700" cap="sq">
                 <a:solidFill>
                   <a:srgbClr val="000000"/>
                 </a:solidFill>
@@ -6209,14 +6209,14 @@
           <a:ln/>
           <a:extLst>
             <a:ext uri="{909E8E84-426E-40dd-AFC4-6F175D3DCCD1}">
-              <a14:hiddenFill xmlns:a14="http://schemas.microsoft.com/office/drawing/2010/main" xmlns="">
+              <a14:hiddenFill xmlns="" xmlns:a14="http://schemas.microsoft.com/office/drawing/2010/main">
                 <a:solidFill>
                   <a:srgbClr val="FFFFFF"/>
                 </a:solidFill>
               </a14:hiddenFill>
             </a:ext>
             <a:ext uri="{91240B29-F687-4f45-9708-019B960494DF}">
-              <a14:hiddenLine xmlns:a14="http://schemas.microsoft.com/office/drawing/2010/main" xmlns="" w="9525">
+              <a14:hiddenLine xmlns="" xmlns:a14="http://schemas.microsoft.com/office/drawing/2010/main" w="9525">
                 <a:solidFill>
                   <a:srgbClr val="000000"/>
                 </a:solidFill>
@@ -6393,14 +6393,14 @@
           </a:ln>
           <a:extLst>
             <a:ext uri="{909E8E84-426E-40dd-AFC4-6F175D3DCCD1}">
-              <a14:hiddenFill xmlns:a14="http://schemas.microsoft.com/office/drawing/2010/main" xmlns="">
+              <a14:hiddenFill xmlns="" xmlns:a14="http://schemas.microsoft.com/office/drawing/2010/main">
                 <a:solidFill>
                   <a:srgbClr val="FFFFFF"/>
                 </a:solidFill>
               </a14:hiddenFill>
             </a:ext>
             <a:ext uri="{91240B29-F687-4f45-9708-019B960494DF}">
-              <a14:hiddenLine xmlns:a14="http://schemas.microsoft.com/office/drawing/2010/main" xmlns="" w="12700" cap="sq">
+              <a14:hiddenLine xmlns="" xmlns:a14="http://schemas.microsoft.com/office/drawing/2010/main" w="12700" cap="sq">
                 <a:solidFill>
                   <a:srgbClr val="000000"/>
                 </a:solidFill>
@@ -6555,7 +6555,7 @@
           </a:ln>
           <a:extLst>
             <a:ext uri="{91240B29-F687-4f45-9708-019B960494DF}">
-              <a14:hiddenLine xmlns:a14="http://schemas.microsoft.com/office/drawing/2010/main" xmlns="" w="12700" cap="sq">
+              <a14:hiddenLine xmlns="" xmlns:a14="http://schemas.microsoft.com/office/drawing/2010/main" w="12700" cap="sq">
                 <a:solidFill>
                   <a:srgbClr val="000000"/>
                 </a:solidFill>
@@ -6749,14 +6749,14 @@
           </a:ln>
           <a:extLst>
             <a:ext uri="{909E8E84-426E-40dd-AFC4-6F175D3DCCD1}">
-              <a14:hiddenFill xmlns:a14="http://schemas.microsoft.com/office/drawing/2010/main" xmlns="">
+              <a14:hiddenFill xmlns="" xmlns:a14="http://schemas.microsoft.com/office/drawing/2010/main">
                 <a:solidFill>
                   <a:srgbClr val="FFFFFF"/>
                 </a:solidFill>
               </a14:hiddenFill>
             </a:ext>
             <a:ext uri="{91240B29-F687-4f45-9708-019B960494DF}">
-              <a14:hiddenLine xmlns:a14="http://schemas.microsoft.com/office/drawing/2010/main" xmlns="" w="12700" cap="sq">
+              <a14:hiddenLine xmlns="" xmlns:a14="http://schemas.microsoft.com/office/drawing/2010/main" w="12700" cap="sq">
                 <a:solidFill>
                   <a:srgbClr val="000000"/>
                 </a:solidFill>
@@ -6911,7 +6911,7 @@
           </a:ln>
           <a:extLst>
             <a:ext uri="{91240B29-F687-4f45-9708-019B960494DF}">
-              <a14:hiddenLine xmlns:a14="http://schemas.microsoft.com/office/drawing/2010/main" xmlns="" w="12700" cap="sq">
+              <a14:hiddenLine xmlns="" xmlns:a14="http://schemas.microsoft.com/office/drawing/2010/main" w="12700" cap="sq">
                 <a:solidFill>
                   <a:srgbClr val="000000"/>
                 </a:solidFill>
@@ -7313,14 +7313,14 @@
           <a:ln/>
           <a:extLst>
             <a:ext uri="{909E8E84-426E-40dd-AFC4-6F175D3DCCD1}">
-              <a14:hiddenFill xmlns="" xmlns:a14="http://schemas.microsoft.com/office/drawing/2010/main">
+              <a14:hiddenFill xmlns:a14="http://schemas.microsoft.com/office/drawing/2010/main" xmlns="">
                 <a:solidFill>
                   <a:srgbClr val="FFFFFF"/>
                 </a:solidFill>
               </a14:hiddenFill>
             </a:ext>
             <a:ext uri="{91240B29-F687-4f45-9708-019B960494DF}">
-              <a14:hiddenLine xmlns="" xmlns:a14="http://schemas.microsoft.com/office/drawing/2010/main" w="9525">
+              <a14:hiddenLine xmlns:a14="http://schemas.microsoft.com/office/drawing/2010/main" xmlns="" w="9525">
                 <a:solidFill>
                   <a:srgbClr val="000000"/>
                 </a:solidFill>
@@ -7502,14 +7502,14 @@
           </a:ln>
           <a:extLst>
             <a:ext uri="{909E8E84-426E-40dd-AFC4-6F175D3DCCD1}">
-              <a14:hiddenFill xmlns="" xmlns:a14="http://schemas.microsoft.com/office/drawing/2010/main">
+              <a14:hiddenFill xmlns:a14="http://schemas.microsoft.com/office/drawing/2010/main" xmlns="">
                 <a:solidFill>
                   <a:srgbClr val="FFFFFF"/>
                 </a:solidFill>
               </a14:hiddenFill>
             </a:ext>
             <a:ext uri="{91240B29-F687-4f45-9708-019B960494DF}">
-              <a14:hiddenLine xmlns="" xmlns:a14="http://schemas.microsoft.com/office/drawing/2010/main" w="12700" cap="sq">
+              <a14:hiddenLine xmlns:a14="http://schemas.microsoft.com/office/drawing/2010/main" xmlns="" w="12700" cap="sq">
                 <a:solidFill>
                   <a:srgbClr val="000000"/>
                 </a:solidFill>
@@ -8189,14 +8189,14 @@
           <a:ln/>
           <a:extLst>
             <a:ext uri="{909E8E84-426E-40dd-AFC4-6F175D3DCCD1}">
-              <a14:hiddenFill xmlns:a14="http://schemas.microsoft.com/office/drawing/2010/main" xmlns="">
+              <a14:hiddenFill xmlns="" xmlns:a14="http://schemas.microsoft.com/office/drawing/2010/main">
                 <a:solidFill>
                   <a:srgbClr val="FFFFFF"/>
                 </a:solidFill>
               </a14:hiddenFill>
             </a:ext>
             <a:ext uri="{91240B29-F687-4f45-9708-019B960494DF}">
-              <a14:hiddenLine xmlns:a14="http://schemas.microsoft.com/office/drawing/2010/main" xmlns="" w="9525">
+              <a14:hiddenLine xmlns="" xmlns:a14="http://schemas.microsoft.com/office/drawing/2010/main" w="9525">
                 <a:solidFill>
                   <a:srgbClr val="000000"/>
                 </a:solidFill>
@@ -8378,14 +8378,14 @@
           </a:ln>
           <a:extLst>
             <a:ext uri="{909E8E84-426E-40dd-AFC4-6F175D3DCCD1}">
-              <a14:hiddenFill xmlns:a14="http://schemas.microsoft.com/office/drawing/2010/main" xmlns="">
+              <a14:hiddenFill xmlns="" xmlns:a14="http://schemas.microsoft.com/office/drawing/2010/main">
                 <a:solidFill>
                   <a:srgbClr val="FFFFFF"/>
                 </a:solidFill>
               </a14:hiddenFill>
             </a:ext>
             <a:ext uri="{91240B29-F687-4f45-9708-019B960494DF}">
-              <a14:hiddenLine xmlns:a14="http://schemas.microsoft.com/office/drawing/2010/main" xmlns="" w="12700" cap="sq">
+              <a14:hiddenLine xmlns="" xmlns:a14="http://schemas.microsoft.com/office/drawing/2010/main" w="12700" cap="sq">
                 <a:solidFill>
                   <a:srgbClr val="000000"/>
                 </a:solidFill>
@@ -8581,7 +8581,7 @@
           </a:ln>
           <a:extLst>
             <a:ext uri="{91240B29-F687-4f45-9708-019B960494DF}">
-              <a14:hiddenLine xmlns="" xmlns:a14="http://schemas.microsoft.com/office/drawing/2010/main" w="12700" cap="sq">
+              <a14:hiddenLine xmlns:a14="http://schemas.microsoft.com/office/drawing/2010/main" xmlns="" w="12700" cap="sq">
                 <a:solidFill>
                   <a:srgbClr val="000000"/>
                 </a:solidFill>
@@ -8749,7 +8749,7 @@
           </a:ln>
           <a:extLst>
             <a:ext uri="{91240B29-F687-4f45-9708-019B960494DF}">
-              <a14:hiddenLine xmlns="" xmlns:a14="http://schemas.microsoft.com/office/drawing/2010/main" w="12700" cap="sq">
+              <a14:hiddenLine xmlns:a14="http://schemas.microsoft.com/office/drawing/2010/main" xmlns="" w="12700" cap="sq">
                 <a:solidFill>
                   <a:srgbClr val="000000"/>
                 </a:solidFill>
@@ -8926,14 +8926,14 @@
           <a:effectLst/>
           <a:extLst>
             <a:ext uri="{909E8E84-426E-40dd-AFC4-6F175D3DCCD1}">
-              <a14:hiddenFill xmlns="" xmlns:a14="http://schemas.microsoft.com/office/drawing/2010/main">
+              <a14:hiddenFill xmlns:a14="http://schemas.microsoft.com/office/drawing/2010/main" xmlns="">
                 <a:solidFill>
                   <a:schemeClr val="accent1"/>
                 </a:solidFill>
               </a14:hiddenFill>
             </a:ext>
             <a:ext uri="{AF507438-7753-43e0-B8FC-AC1667EBCBE1}">
-              <a14:hiddenEffects xmlns="" xmlns:a14="http://schemas.microsoft.com/office/drawing/2010/main">
+              <a14:hiddenEffects xmlns:a14="http://schemas.microsoft.com/office/drawing/2010/main" xmlns="">
                 <a:effectLst>
                   <a:outerShdw blurRad="63500" dist="35921" dir="2700000" algn="ctr" rotWithShape="0">
                     <a:schemeClr val="bg2"/>
@@ -9002,14 +9002,14 @@
           <a:effectLst/>
           <a:extLst>
             <a:ext uri="{909E8E84-426E-40dd-AFC4-6F175D3DCCD1}">
-              <a14:hiddenFill xmlns="" xmlns:a14="http://schemas.microsoft.com/office/drawing/2010/main">
+              <a14:hiddenFill xmlns:a14="http://schemas.microsoft.com/office/drawing/2010/main" xmlns="">
                 <a:solidFill>
                   <a:schemeClr val="accent1"/>
                 </a:solidFill>
               </a14:hiddenFill>
             </a:ext>
             <a:ext uri="{AF507438-7753-43e0-B8FC-AC1667EBCBE1}">
-              <a14:hiddenEffects xmlns="" xmlns:a14="http://schemas.microsoft.com/office/drawing/2010/main">
+              <a14:hiddenEffects xmlns:a14="http://schemas.microsoft.com/office/drawing/2010/main" xmlns="">
                 <a:effectLst>
                   <a:outerShdw blurRad="63500" dist="35921" dir="2700000" algn="ctr" rotWithShape="0">
                     <a:schemeClr val="bg2"/>
@@ -9587,14 +9587,14 @@
           <a:ln/>
           <a:extLst>
             <a:ext uri="{909E8E84-426E-40dd-AFC4-6F175D3DCCD1}">
-              <a14:hiddenFill xmlns="" xmlns:a14="http://schemas.microsoft.com/office/drawing/2010/main">
+              <a14:hiddenFill xmlns:a14="http://schemas.microsoft.com/office/drawing/2010/main" xmlns="">
                 <a:solidFill>
                   <a:srgbClr val="FFFFFF"/>
                 </a:solidFill>
               </a14:hiddenFill>
             </a:ext>
             <a:ext uri="{91240B29-F687-4f45-9708-019B960494DF}">
-              <a14:hiddenLine xmlns="" xmlns:a14="http://schemas.microsoft.com/office/drawing/2010/main" w="9525">
+              <a14:hiddenLine xmlns:a14="http://schemas.microsoft.com/office/drawing/2010/main" xmlns="" w="9525">
                 <a:solidFill>
                   <a:srgbClr val="000000"/>
                 </a:solidFill>
@@ -9776,14 +9776,14 @@
           </a:ln>
           <a:extLst>
             <a:ext uri="{909E8E84-426E-40dd-AFC4-6F175D3DCCD1}">
-              <a14:hiddenFill xmlns="" xmlns:a14="http://schemas.microsoft.com/office/drawing/2010/main">
+              <a14:hiddenFill xmlns:a14="http://schemas.microsoft.com/office/drawing/2010/main" xmlns="">
                 <a:solidFill>
                   <a:srgbClr val="FFFFFF"/>
                 </a:solidFill>
               </a14:hiddenFill>
             </a:ext>
             <a:ext uri="{91240B29-F687-4f45-9708-019B960494DF}">
-              <a14:hiddenLine xmlns="" xmlns:a14="http://schemas.microsoft.com/office/drawing/2010/main" w="12700" cap="sq">
+              <a14:hiddenLine xmlns:a14="http://schemas.microsoft.com/office/drawing/2010/main" xmlns="" w="12700" cap="sq">
                 <a:solidFill>
                   <a:srgbClr val="000000"/>
                 </a:solidFill>
@@ -9969,7 +9969,7 @@
           </a:ln>
           <a:extLst>
             <a:ext uri="{91240B29-F687-4f45-9708-019B960494DF}">
-              <a14:hiddenLine xmlns="" xmlns:a14="http://schemas.microsoft.com/office/drawing/2010/main" w="12700" cap="sq">
+              <a14:hiddenLine xmlns:a14="http://schemas.microsoft.com/office/drawing/2010/main" xmlns="" w="12700" cap="sq">
                 <a:solidFill>
                   <a:srgbClr val="000000"/>
                 </a:solidFill>
@@ -10218,14 +10218,14 @@
           <a:ln/>
           <a:extLst>
             <a:ext uri="{909E8E84-426E-40dd-AFC4-6F175D3DCCD1}">
-              <a14:hiddenFill xmlns:a14="http://schemas.microsoft.com/office/drawing/2010/main" xmlns="">
+              <a14:hiddenFill xmlns="" xmlns:a14="http://schemas.microsoft.com/office/drawing/2010/main">
                 <a:solidFill>
                   <a:srgbClr val="FFFFFF"/>
                 </a:solidFill>
               </a14:hiddenFill>
             </a:ext>
             <a:ext uri="{91240B29-F687-4f45-9708-019B960494DF}">
-              <a14:hiddenLine xmlns:a14="http://schemas.microsoft.com/office/drawing/2010/main" xmlns="" w="9525">
+              <a14:hiddenLine xmlns="" xmlns:a14="http://schemas.microsoft.com/office/drawing/2010/main" w="9525">
                 <a:solidFill>
                   <a:srgbClr val="000000"/>
                 </a:solidFill>
@@ -10407,14 +10407,14 @@
           </a:ln>
           <a:extLst>
             <a:ext uri="{909E8E84-426E-40dd-AFC4-6F175D3DCCD1}">
-              <a14:hiddenFill xmlns:a14="http://schemas.microsoft.com/office/drawing/2010/main" xmlns="">
+              <a14:hiddenFill xmlns="" xmlns:a14="http://schemas.microsoft.com/office/drawing/2010/main">
                 <a:solidFill>
                   <a:srgbClr val="FFFFFF"/>
                 </a:solidFill>
               </a14:hiddenFill>
             </a:ext>
             <a:ext uri="{91240B29-F687-4f45-9708-019B960494DF}">
-              <a14:hiddenLine xmlns:a14="http://schemas.microsoft.com/office/drawing/2010/main" xmlns="" w="12700" cap="sq">
+              <a14:hiddenLine xmlns="" xmlns:a14="http://schemas.microsoft.com/office/drawing/2010/main" w="12700" cap="sq">
                 <a:solidFill>
                   <a:srgbClr val="000000"/>
                 </a:solidFill>
@@ -10658,7 +10658,7 @@
           </a:ln>
           <a:extLst>
             <a:ext uri="{91240B29-F687-4f45-9708-019B960494DF}">
-              <a14:hiddenLine xmlns="" xmlns:a14="http://schemas.microsoft.com/office/drawing/2010/main" w="12700" cap="sq">
+              <a14:hiddenLine xmlns:a14="http://schemas.microsoft.com/office/drawing/2010/main" xmlns="" w="12700" cap="sq">
                 <a:solidFill>
                   <a:srgbClr val="000000"/>
                 </a:solidFill>
@@ -10863,7 +10863,7 @@
           </a:ln>
           <a:extLst>
             <a:ext uri="{91240B29-F687-4f45-9708-019B960494DF}">
-              <a14:hiddenLine xmlns="" xmlns:a14="http://schemas.microsoft.com/office/drawing/2010/main" w="12700" cap="sq">
+              <a14:hiddenLine xmlns:a14="http://schemas.microsoft.com/office/drawing/2010/main" xmlns="" w="12700" cap="sq">
                 <a:solidFill>
                   <a:srgbClr val="000000"/>
                 </a:solidFill>
@@ -11517,14 +11517,14 @@
           <a:ln/>
           <a:extLst>
             <a:ext uri="{909E8E84-426E-40dd-AFC4-6F175D3DCCD1}">
-              <a14:hiddenFill xmlns="" xmlns:a14="http://schemas.microsoft.com/office/drawing/2010/main">
+              <a14:hiddenFill xmlns:a14="http://schemas.microsoft.com/office/drawing/2010/main" xmlns="">
                 <a:solidFill>
                   <a:srgbClr val="FFFFFF"/>
                 </a:solidFill>
               </a14:hiddenFill>
             </a:ext>
             <a:ext uri="{91240B29-F687-4f45-9708-019B960494DF}">
-              <a14:hiddenLine xmlns="" xmlns:a14="http://schemas.microsoft.com/office/drawing/2010/main" w="9525">
+              <a14:hiddenLine xmlns:a14="http://schemas.microsoft.com/office/drawing/2010/main" xmlns="" w="9525">
                 <a:solidFill>
                   <a:srgbClr val="000000"/>
                 </a:solidFill>
@@ -11701,8 +11701,8 @@
         </p:nvSpPr>
         <p:spPr>
           <a:xfrm>
-            <a:off x="2123440" y="1895049"/>
-            <a:ext cx="7670800" cy="3970318"/>
+            <a:off x="2083246" y="854789"/>
+            <a:ext cx="7670800" cy="6555641"/>
           </a:xfrm>
           <a:prstGeom prst="rect">
             <a:avLst/>
@@ -11716,15 +11716,7 @@
           <a:p>
             <a:r>
               <a:rPr lang="en-IE" dirty="0"/>
-              <a:t> We will use Data.Text when working on  some kinds </a:t>
-            </a:r>
-            <a:r>
-              <a:rPr lang="en-IE"/>
-              <a:t>of  data</a:t>
-            </a:r>
-            <a:r>
-              <a:rPr lang="en-IE" dirty="0"/>
-              <a:t>:</a:t>
+              <a:t> We will use Data.Text when working on  some kinds of  data:</a:t>
             </a:r>
           </a:p>
           <a:p>
@@ -11753,14 +11745,68 @@
           </a:p>
           <a:p>
             <a:r>
+              <a:rPr lang="en-IE" dirty="0">
+                <a:hlinkClick r:id="rId2"/>
+              </a:rPr>
+              <a:t>https://hackage.haskell.org/package/text-1.2.4.1/docs/Data-Text.html</a:t>
+            </a:r>
+            <a:endParaRPr lang="en-IE" dirty="0"/>
+          </a:p>
+          <a:p>
+            <a:endParaRPr lang="en-IE" dirty="0"/>
+          </a:p>
+          <a:p>
+            <a:r>
               <a:rPr lang="en-IE" dirty="0"/>
-              <a:t>https://hackage.haskell.org/package/text-1.2.4.1/docs/Data-</a:t>
+              <a:t>See lab exercise on </a:t>
             </a:r>
             <a:r>
               <a:rPr lang="en-IE" dirty="0" err="1"/>
-              <a:t>Text.html</a:t>
+              <a:t>Data.Text</a:t>
+            </a:r>
+            <a:r>
+              <a:rPr lang="en-IE" dirty="0"/>
+              <a:t> for an example on using </a:t>
+            </a:r>
+            <a:r>
+              <a:rPr lang="en-IE" dirty="0" err="1"/>
+              <a:t>Data.Text</a:t>
+            </a:r>
+            <a:r>
+              <a:rPr lang="en-IE" dirty="0"/>
+              <a:t> and some of its functions: </a:t>
+            </a:r>
+          </a:p>
+          <a:p>
+            <a:r>
+              <a:rPr lang="en-IE" dirty="0"/>
+              <a:t>		</a:t>
+            </a:r>
+            <a:r>
+              <a:rPr lang="en-IE" dirty="0" err="1"/>
+              <a:t>toLower</a:t>
+            </a:r>
+            <a:r>
+              <a:rPr lang="en-IE" dirty="0"/>
+              <a:t>,</a:t>
+            </a:r>
+          </a:p>
+          <a:p>
+            <a:r>
+              <a:rPr lang="en-IE" dirty="0"/>
+              <a:t>	</a:t>
+            </a:r>
+            <a:r>
+              <a:rPr lang="en-IE"/>
+              <a:t>	filter,</a:t>
             </a:r>
             <a:endParaRPr lang="en-IE" dirty="0"/>
+          </a:p>
+          <a:p>
+            <a:r>
+              <a:rPr lang="en-IE" dirty="0"/>
+              <a:t>		pack, unpack</a:t>
+            </a:r>
           </a:p>
           <a:p>
             <a:pPr marL="457200" indent="-457200">
@@ -12063,14 +12109,14 @@
         <a:effectLst/>
         <a:extLst>
           <a:ext uri="{909E8E84-426E-40dd-AFC4-6F175D3DCCD1}">
-            <a14:hiddenFill xmlns:a14="http://schemas.microsoft.com/office/drawing/2010/main" xmlns="">
+            <a14:hiddenFill xmlns="" xmlns:a14="http://schemas.microsoft.com/office/drawing/2010/main">
               <a:solidFill>
                 <a:schemeClr val="accent1"/>
               </a:solidFill>
             </a14:hiddenFill>
           </a:ext>
           <a:ext uri="{AF507438-7753-43e0-B8FC-AC1667EBCBE1}">
-            <a14:hiddenEffects xmlns:a14="http://schemas.microsoft.com/office/drawing/2010/main" xmlns="">
+            <a14:hiddenEffects xmlns="" xmlns:a14="http://schemas.microsoft.com/office/drawing/2010/main">
               <a:effectLst>
                 <a:outerShdw blurRad="63500" dist="35921" dir="2700000" algn="ctr" rotWithShape="0">
                   <a:schemeClr val="bg2"/>
@@ -12143,14 +12189,14 @@
         <a:effectLst/>
         <a:extLst>
           <a:ext uri="{909E8E84-426E-40dd-AFC4-6F175D3DCCD1}">
-            <a14:hiddenFill xmlns:a14="http://schemas.microsoft.com/office/drawing/2010/main" xmlns="">
+            <a14:hiddenFill xmlns="" xmlns:a14="http://schemas.microsoft.com/office/drawing/2010/main">
               <a:solidFill>
                 <a:schemeClr val="accent1"/>
               </a:solidFill>
             </a14:hiddenFill>
           </a:ext>
           <a:ext uri="{AF507438-7753-43e0-B8FC-AC1667EBCBE1}">
-            <a14:hiddenEffects xmlns:a14="http://schemas.microsoft.com/office/drawing/2010/main" xmlns="">
+            <a14:hiddenEffects xmlns="" xmlns:a14="http://schemas.microsoft.com/office/drawing/2010/main">
               <a:effectLst>
                 <a:outerShdw blurRad="63500" dist="35921" dir="2700000" algn="ctr" rotWithShape="0">
                   <a:schemeClr val="bg2"/>

</xml_diff>